<commit_message>
oox smartart, picture strip: fix too many columns with aspect ratio request
The bugdoc has 3 items in the picture strip and PowerPoint laid this out
as a single column with 3 rows (as a snake algorithm). We used to put
the first two items to the first row and the third item to the second
row.

Improve out layout by taking into account what aspect ratio the child
algorithms request: this way it's obvious that we should use a single
column in case we have a large enough aspect ratio and few enough items.

(PowerPoint also uses multiple columns without the aspect ratio
request.)

Change-Id: I9f1158c04c665fc6a2c85e4ac3a1ed363b1c75fb
Reviewed-on: https://gerrit.libreoffice.org/68370
Reviewed-by: Miklos Vajna <vmiklos@collabora.com>
Tested-by: Jenkins
</commit_message>
<xml_diff>
--- a/sd/qa/unit/data/pptx/smartart-picture-strip.pptx
+++ b/sd/qa/unit/data/pptx/smartart-picture-strip.pptx
@@ -942,6 +942,43 @@
         </a:p>
       </dgm:t>
     </dgm:pt>
+    <dgm:pt modelId="{2AD22C76-D048-4799-969B-29D5448DC1B9}">
+      <dgm:prSet phldrT="[Text]"/>
+      <dgm:spPr/>
+      <dgm:t>
+        <a:bodyPr/>
+        <a:lstStyle/>
+        <a:p>
+          <a:r>
+            <a:rPr lang="en-US" dirty="0" smtClean="0"/>
+            <a:t>C</a:t>
+          </a:r>
+          <a:endParaRPr lang="en-US" dirty="0"/>
+        </a:p>
+      </dgm:t>
+    </dgm:pt>
+    <dgm:pt modelId="{B856EC74-5923-4928-8B90-112927FA1FF8}" type="parTrans" cxnId="{18CE7C0F-3887-4526-B121-73AEADD79B61}">
+      <dgm:prSet/>
+      <dgm:spPr/>
+      <dgm:t>
+        <a:bodyPr/>
+        <a:lstStyle/>
+        <a:p>
+          <a:endParaRPr lang="en-US"/>
+        </a:p>
+      </dgm:t>
+    </dgm:pt>
+    <dgm:pt modelId="{289A3E40-98C1-4F9F-B3CA-7C964BEADC29}" type="sibTrans" cxnId="{18CE7C0F-3887-4526-B121-73AEADD79B61}">
+      <dgm:prSet/>
+      <dgm:spPr/>
+      <dgm:t>
+        <a:bodyPr/>
+        <a:lstStyle/>
+        <a:p>
+          <a:endParaRPr lang="en-US"/>
+        </a:p>
+      </dgm:t>
+    </dgm:pt>
     <dgm:pt modelId="{A1720E84-3BC0-4F19-944F-1AE5DFB3D66E}" type="pres">
       <dgm:prSet presAssocID="{8B7E5F79-0A9E-4878-8BD8-CCC7B1EB4A29}" presName="Name0" presStyleCnt="0">
         <dgm:presLayoutVars>
@@ -950,21 +987,35 @@
         </dgm:presLayoutVars>
       </dgm:prSet>
       <dgm:spPr/>
+      <dgm:t>
+        <a:bodyPr/>
+        <a:lstStyle/>
+        <a:p>
+          <a:endParaRPr lang="en-US"/>
+        </a:p>
+      </dgm:t>
     </dgm:pt>
     <dgm:pt modelId="{2A51146D-EE18-4929-8268-A6A5BA2DC20C}" type="pres">
       <dgm:prSet presAssocID="{6C48A404-2A3A-41E9-9551-8F4435666C27}" presName="composite" presStyleCnt="0"/>
       <dgm:spPr/>
     </dgm:pt>
     <dgm:pt modelId="{7E7AB9D8-99CC-4DBB-BA44-73B391D36B9E}" type="pres">
-      <dgm:prSet presAssocID="{6C48A404-2A3A-41E9-9551-8F4435666C27}" presName="rect1" presStyleLbl="trAlignAcc1" presStyleIdx="0" presStyleCnt="2">
+      <dgm:prSet presAssocID="{6C48A404-2A3A-41E9-9551-8F4435666C27}" presName="rect1" presStyleLbl="trAlignAcc1" presStyleIdx="0" presStyleCnt="3">
         <dgm:presLayoutVars>
           <dgm:bulletEnabled val="1"/>
         </dgm:presLayoutVars>
       </dgm:prSet>
       <dgm:spPr/>
+      <dgm:t>
+        <a:bodyPr/>
+        <a:lstStyle/>
+        <a:p>
+          <a:endParaRPr lang="en-US"/>
+        </a:p>
+      </dgm:t>
     </dgm:pt>
     <dgm:pt modelId="{44792CB7-8371-4135-AD15-B12EBD420003}" type="pres">
-      <dgm:prSet presAssocID="{6C48A404-2A3A-41E9-9551-8F4435666C27}" presName="rect2" presStyleLbl="fgImgPlace1" presStyleIdx="0" presStyleCnt="2"/>
+      <dgm:prSet presAssocID="{6C48A404-2A3A-41E9-9551-8F4435666C27}" presName="rect2" presStyleLbl="fgImgPlace1" presStyleIdx="0" presStyleCnt="3"/>
       <dgm:spPr>
         <a:blipFill>
           <a:blip xmlns:r="http://schemas.openxmlformats.org/officeDocument/2006/relationships" r:embed="rId1">
@@ -980,6 +1031,13 @@
           </a:stretch>
         </a:blipFill>
       </dgm:spPr>
+      <dgm:t>
+        <a:bodyPr/>
+        <a:lstStyle/>
+        <a:p>
+          <a:endParaRPr lang="en-US"/>
+        </a:p>
+      </dgm:t>
     </dgm:pt>
     <dgm:pt modelId="{5F1C1BA8-DB31-470A-A607-4CB3B9772938}" type="pres">
       <dgm:prSet presAssocID="{41EDF22C-EA53-4F09-ADDE-88EFF27DD7B2}" presName="sibTrans" presStyleCnt="0"/>
@@ -990,15 +1048,22 @@
       <dgm:spPr/>
     </dgm:pt>
     <dgm:pt modelId="{B289A356-FE39-47ED-BB52-2F8CC40EB54B}" type="pres">
-      <dgm:prSet presAssocID="{6E36731A-BABB-4BC5-8885-2755F9701CF3}" presName="rect1" presStyleLbl="trAlignAcc1" presStyleIdx="1" presStyleCnt="2">
+      <dgm:prSet presAssocID="{6E36731A-BABB-4BC5-8885-2755F9701CF3}" presName="rect1" presStyleLbl="trAlignAcc1" presStyleIdx="1" presStyleCnt="3">
         <dgm:presLayoutVars>
           <dgm:bulletEnabled val="1"/>
         </dgm:presLayoutVars>
       </dgm:prSet>
       <dgm:spPr/>
+      <dgm:t>
+        <a:bodyPr/>
+        <a:lstStyle/>
+        <a:p>
+          <a:endParaRPr lang="en-US"/>
+        </a:p>
+      </dgm:t>
     </dgm:pt>
     <dgm:pt modelId="{6973D5E7-EF2D-4AD8-9D7E-BABA122939BD}" type="pres">
-      <dgm:prSet presAssocID="{6E36731A-BABB-4BC5-8885-2755F9701CF3}" presName="rect2" presStyleLbl="fgImgPlace1" presStyleIdx="1" presStyleCnt="2"/>
+      <dgm:prSet presAssocID="{6E36731A-BABB-4BC5-8885-2755F9701CF3}" presName="rect2" presStyleLbl="fgImgPlace1" presStyleIdx="1" presStyleCnt="3"/>
       <dgm:spPr>
         <a:blipFill>
           <a:blip xmlns:r="http://schemas.openxmlformats.org/officeDocument/2006/relationships" r:embed="rId2">
@@ -1014,14 +1079,71 @@
           </a:stretch>
         </a:blipFill>
       </dgm:spPr>
+      <dgm:t>
+        <a:bodyPr/>
+        <a:lstStyle/>
+        <a:p>
+          <a:endParaRPr lang="en-US"/>
+        </a:p>
+      </dgm:t>
+    </dgm:pt>
+    <dgm:pt modelId="{B41CACB0-B670-4C81-AFA5-52DA8F9F2FC6}" type="pres">
+      <dgm:prSet presAssocID="{318E85FB-D67A-4E7D-BBEF-3BE719356DA9}" presName="sibTrans" presStyleCnt="0"/>
+      <dgm:spPr/>
+    </dgm:pt>
+    <dgm:pt modelId="{FA01C431-2C88-4AD3-AA8B-98CE287A77DF}" type="pres">
+      <dgm:prSet presAssocID="{2AD22C76-D048-4799-969B-29D5448DC1B9}" presName="composite" presStyleCnt="0"/>
+      <dgm:spPr/>
+    </dgm:pt>
+    <dgm:pt modelId="{D9A904C1-E1C3-4371-BE78-9DC3909244BF}" type="pres">
+      <dgm:prSet presAssocID="{2AD22C76-D048-4799-969B-29D5448DC1B9}" presName="rect1" presStyleLbl="trAlignAcc1" presStyleIdx="2" presStyleCnt="3">
+        <dgm:presLayoutVars>
+          <dgm:bulletEnabled val="1"/>
+        </dgm:presLayoutVars>
+      </dgm:prSet>
+      <dgm:spPr/>
+      <dgm:t>
+        <a:bodyPr/>
+        <a:lstStyle/>
+        <a:p>
+          <a:endParaRPr lang="en-US"/>
+        </a:p>
+      </dgm:t>
+    </dgm:pt>
+    <dgm:pt modelId="{F7720D7A-E5C7-4DAF-82BA-B43BECB5DE65}" type="pres">
+      <dgm:prSet presAssocID="{2AD22C76-D048-4799-969B-29D5448DC1B9}" presName="rect2" presStyleLbl="fgImgPlace1" presStyleIdx="2" presStyleCnt="3"/>
+      <dgm:spPr>
+        <a:blipFill>
+          <a:blip xmlns:r="http://schemas.openxmlformats.org/officeDocument/2006/relationships" r:embed="rId3">
+            <a:extLst>
+              <a:ext uri="{28A0092B-C50C-407E-A947-70E740481C1C}">
+                <a14:useLocalDpi xmlns:a14="http://schemas.microsoft.com/office/drawing/2010/main" val="0"/>
+              </a:ext>
+            </a:extLst>
+          </a:blip>
+          <a:srcRect/>
+          <a:stretch>
+            <a:fillRect l="-25000" r="-25000"/>
+          </a:stretch>
+        </a:blipFill>
+      </dgm:spPr>
+      <dgm:t>
+        <a:bodyPr/>
+        <a:lstStyle/>
+        <a:p>
+          <a:endParaRPr lang="en-US"/>
+        </a:p>
+      </dgm:t>
     </dgm:pt>
   </dgm:ptLst>
   <dgm:cxnLst>
+    <dgm:cxn modelId="{1A8A81B5-B3D2-400E-BA78-BC1E1FCEB9A3}" type="presOf" srcId="{8B7E5F79-0A9E-4878-8BD8-CCC7B1EB4A29}" destId="{A1720E84-3BC0-4F19-944F-1AE5DFB3D66E}" srcOrd="0" destOrd="0" presId="urn:microsoft.com/office/officeart/2008/layout/PictureStrips"/>
+    <dgm:cxn modelId="{E9D77401-8819-43CE-9EFF-9F6C7E19B2B1}" type="presOf" srcId="{6E36731A-BABB-4BC5-8885-2755F9701CF3}" destId="{B289A356-FE39-47ED-BB52-2F8CC40EB54B}" srcOrd="0" destOrd="0" presId="urn:microsoft.com/office/officeart/2008/layout/PictureStrips"/>
+    <dgm:cxn modelId="{18CE7C0F-3887-4526-B121-73AEADD79B61}" srcId="{8B7E5F79-0A9E-4878-8BD8-CCC7B1EB4A29}" destId="{2AD22C76-D048-4799-969B-29D5448DC1B9}" srcOrd="2" destOrd="0" parTransId="{B856EC74-5923-4928-8B90-112927FA1FF8}" sibTransId="{289A3E40-98C1-4F9F-B3CA-7C964BEADC29}"/>
     <dgm:cxn modelId="{FDDF44FB-1C13-43F8-8B7F-856FE25A6B64}" srcId="{8B7E5F79-0A9E-4878-8BD8-CCC7B1EB4A29}" destId="{6E36731A-BABB-4BC5-8885-2755F9701CF3}" srcOrd="1" destOrd="0" parTransId="{164D9F7F-7FB8-4299-8F64-DF74348488EF}" sibTransId="{318E85FB-D67A-4E7D-BBEF-3BE719356DA9}"/>
-    <dgm:cxn modelId="{E9D77401-8819-43CE-9EFF-9F6C7E19B2B1}" type="presOf" srcId="{6E36731A-BABB-4BC5-8885-2755F9701CF3}" destId="{B289A356-FE39-47ED-BB52-2F8CC40EB54B}" srcOrd="0" destOrd="0" presId="urn:microsoft.com/office/officeart/2008/layout/PictureStrips"/>
-    <dgm:cxn modelId="{1A8A81B5-B3D2-400E-BA78-BC1E1FCEB9A3}" type="presOf" srcId="{8B7E5F79-0A9E-4878-8BD8-CCC7B1EB4A29}" destId="{A1720E84-3BC0-4F19-944F-1AE5DFB3D66E}" srcOrd="0" destOrd="0" presId="urn:microsoft.com/office/officeart/2008/layout/PictureStrips"/>
+    <dgm:cxn modelId="{BCCDD84C-A48A-4004-8FAA-7E49077D10F4}" type="presOf" srcId="{2AD22C76-D048-4799-969B-29D5448DC1B9}" destId="{D9A904C1-E1C3-4371-BE78-9DC3909244BF}" srcOrd="0" destOrd="0" presId="urn:microsoft.com/office/officeart/2008/layout/PictureStrips"/>
+    <dgm:cxn modelId="{11C50C62-4FCE-47D5-B4CF-2C0C2AB8375D}" srcId="{8B7E5F79-0A9E-4878-8BD8-CCC7B1EB4A29}" destId="{6C48A404-2A3A-41E9-9551-8F4435666C27}" srcOrd="0" destOrd="0" parTransId="{A5330F8F-9988-4C00-80C1-103E053A62EA}" sibTransId="{41EDF22C-EA53-4F09-ADDE-88EFF27DD7B2}"/>
     <dgm:cxn modelId="{7B88B215-C61E-4C40-AF05-D7EC5D62CE4C}" type="presOf" srcId="{6C48A404-2A3A-41E9-9551-8F4435666C27}" destId="{7E7AB9D8-99CC-4DBB-BA44-73B391D36B9E}" srcOrd="0" destOrd="0" presId="urn:microsoft.com/office/officeart/2008/layout/PictureStrips"/>
-    <dgm:cxn modelId="{11C50C62-4FCE-47D5-B4CF-2C0C2AB8375D}" srcId="{8B7E5F79-0A9E-4878-8BD8-CCC7B1EB4A29}" destId="{6C48A404-2A3A-41E9-9551-8F4435666C27}" srcOrd="0" destOrd="0" parTransId="{A5330F8F-9988-4C00-80C1-103E053A62EA}" sibTransId="{41EDF22C-EA53-4F09-ADDE-88EFF27DD7B2}"/>
     <dgm:cxn modelId="{A62CB844-CEB4-479B-A435-AD286C43BC62}" type="presParOf" srcId="{A1720E84-3BC0-4F19-944F-1AE5DFB3D66E}" destId="{2A51146D-EE18-4929-8268-A6A5BA2DC20C}" srcOrd="0" destOrd="0" presId="urn:microsoft.com/office/officeart/2008/layout/PictureStrips"/>
     <dgm:cxn modelId="{69467D8D-EB22-4EEE-866C-F8929DF03B3E}" type="presParOf" srcId="{2A51146D-EE18-4929-8268-A6A5BA2DC20C}" destId="{7E7AB9D8-99CC-4DBB-BA44-73B391D36B9E}" srcOrd="0" destOrd="0" presId="urn:microsoft.com/office/officeart/2008/layout/PictureStrips"/>
     <dgm:cxn modelId="{DEE94FAF-4DA9-4624-80D0-803648082CC1}" type="presParOf" srcId="{2A51146D-EE18-4929-8268-A6A5BA2DC20C}" destId="{44792CB7-8371-4135-AD15-B12EBD420003}" srcOrd="1" destOrd="0" presId="urn:microsoft.com/office/officeart/2008/layout/PictureStrips"/>
@@ -1029,6 +1151,10 @@
     <dgm:cxn modelId="{D5800BDB-6800-4915-A161-5C1D7DF778C5}" type="presParOf" srcId="{A1720E84-3BC0-4F19-944F-1AE5DFB3D66E}" destId="{25D1A872-92C7-4867-A789-38CAA67C2FDC}" srcOrd="2" destOrd="0" presId="urn:microsoft.com/office/officeart/2008/layout/PictureStrips"/>
     <dgm:cxn modelId="{F8810D48-15BD-47B7-85BA-977633E30807}" type="presParOf" srcId="{25D1A872-92C7-4867-A789-38CAA67C2FDC}" destId="{B289A356-FE39-47ED-BB52-2F8CC40EB54B}" srcOrd="0" destOrd="0" presId="urn:microsoft.com/office/officeart/2008/layout/PictureStrips"/>
     <dgm:cxn modelId="{EB28CD5C-EFE6-4899-BA7A-1444BF3C7A96}" type="presParOf" srcId="{25D1A872-92C7-4867-A789-38CAA67C2FDC}" destId="{6973D5E7-EF2D-4AD8-9D7E-BABA122939BD}" srcOrd="1" destOrd="0" presId="urn:microsoft.com/office/officeart/2008/layout/PictureStrips"/>
+    <dgm:cxn modelId="{98795BD3-DCD1-4664-A87A-6320F90648A5}" type="presParOf" srcId="{A1720E84-3BC0-4F19-944F-1AE5DFB3D66E}" destId="{B41CACB0-B670-4C81-AFA5-52DA8F9F2FC6}" srcOrd="3" destOrd="0" presId="urn:microsoft.com/office/officeart/2008/layout/PictureStrips"/>
+    <dgm:cxn modelId="{5C1D0014-8CC1-48AE-9266-060C93598C08}" type="presParOf" srcId="{A1720E84-3BC0-4F19-944F-1AE5DFB3D66E}" destId="{FA01C431-2C88-4AD3-AA8B-98CE287A77DF}" srcOrd="4" destOrd="0" presId="urn:microsoft.com/office/officeart/2008/layout/PictureStrips"/>
+    <dgm:cxn modelId="{708A06CE-3E4E-4BAD-ABCB-0F64A0D1893D}" type="presParOf" srcId="{FA01C431-2C88-4AD3-AA8B-98CE287A77DF}" destId="{D9A904C1-E1C3-4371-BE78-9DC3909244BF}" srcOrd="0" destOrd="0" presId="urn:microsoft.com/office/officeart/2008/layout/PictureStrips"/>
+    <dgm:cxn modelId="{5E76C815-300D-488B-B15C-75249298FAB8}" type="presParOf" srcId="{FA01C431-2C88-4AD3-AA8B-98CE287A77DF}" destId="{F7720D7A-E5C7-4DAF-82BA-B43BECB5DE65}" srcOrd="1" destOrd="0" presId="urn:microsoft.com/office/officeart/2008/layout/PictureStrips"/>
   </dgm:cxnLst>
   <dgm:bg/>
   <dgm:whole/>
@@ -2462,7 +2588,7 @@
           <a:p>
             <a:fld id="{C747211F-258E-46ED-BA6A-514D91012CD2}" type="datetimeFigureOut">
               <a:rPr lang="en-US" smtClean="0"/>
-              <a:t>2/21/2019</a:t>
+              <a:t>2/25/2019</a:t>
             </a:fld>
             <a:endParaRPr lang="en-US"/>
           </a:p>
@@ -2632,7 +2758,7 @@
           <a:p>
             <a:fld id="{C747211F-258E-46ED-BA6A-514D91012CD2}" type="datetimeFigureOut">
               <a:rPr lang="en-US" smtClean="0"/>
-              <a:t>2/21/2019</a:t>
+              <a:t>2/25/2019</a:t>
             </a:fld>
             <a:endParaRPr lang="en-US"/>
           </a:p>
@@ -2812,7 +2938,7 @@
           <a:p>
             <a:fld id="{C747211F-258E-46ED-BA6A-514D91012CD2}" type="datetimeFigureOut">
               <a:rPr lang="en-US" smtClean="0"/>
-              <a:t>2/21/2019</a:t>
+              <a:t>2/25/2019</a:t>
             </a:fld>
             <a:endParaRPr lang="en-US"/>
           </a:p>
@@ -2982,7 +3108,7 @@
           <a:p>
             <a:fld id="{C747211F-258E-46ED-BA6A-514D91012CD2}" type="datetimeFigureOut">
               <a:rPr lang="en-US" smtClean="0"/>
-              <a:t>2/21/2019</a:t>
+              <a:t>2/25/2019</a:t>
             </a:fld>
             <a:endParaRPr lang="en-US"/>
           </a:p>
@@ -3228,7 +3354,7 @@
           <a:p>
             <a:fld id="{C747211F-258E-46ED-BA6A-514D91012CD2}" type="datetimeFigureOut">
               <a:rPr lang="en-US" smtClean="0"/>
-              <a:t>2/21/2019</a:t>
+              <a:t>2/25/2019</a:t>
             </a:fld>
             <a:endParaRPr lang="en-US"/>
           </a:p>
@@ -3516,7 +3642,7 @@
           <a:p>
             <a:fld id="{C747211F-258E-46ED-BA6A-514D91012CD2}" type="datetimeFigureOut">
               <a:rPr lang="en-US" smtClean="0"/>
-              <a:t>2/21/2019</a:t>
+              <a:t>2/25/2019</a:t>
             </a:fld>
             <a:endParaRPr lang="en-US"/>
           </a:p>
@@ -3938,7 +4064,7 @@
           <a:p>
             <a:fld id="{C747211F-258E-46ED-BA6A-514D91012CD2}" type="datetimeFigureOut">
               <a:rPr lang="en-US" smtClean="0"/>
-              <a:t>2/21/2019</a:t>
+              <a:t>2/25/2019</a:t>
             </a:fld>
             <a:endParaRPr lang="en-US"/>
           </a:p>
@@ -4056,7 +4182,7 @@
           <a:p>
             <a:fld id="{C747211F-258E-46ED-BA6A-514D91012CD2}" type="datetimeFigureOut">
               <a:rPr lang="en-US" smtClean="0"/>
-              <a:t>2/21/2019</a:t>
+              <a:t>2/25/2019</a:t>
             </a:fld>
             <a:endParaRPr lang="en-US"/>
           </a:p>
@@ -4151,7 +4277,7 @@
           <a:p>
             <a:fld id="{C747211F-258E-46ED-BA6A-514D91012CD2}" type="datetimeFigureOut">
               <a:rPr lang="en-US" smtClean="0"/>
-              <a:t>2/21/2019</a:t>
+              <a:t>2/25/2019</a:t>
             </a:fld>
             <a:endParaRPr lang="en-US"/>
           </a:p>
@@ -4428,7 +4554,7 @@
           <a:p>
             <a:fld id="{C747211F-258E-46ED-BA6A-514D91012CD2}" type="datetimeFigureOut">
               <a:rPr lang="en-US" smtClean="0"/>
-              <a:t>2/21/2019</a:t>
+              <a:t>2/25/2019</a:t>
             </a:fld>
             <a:endParaRPr lang="en-US"/>
           </a:p>
@@ -4681,7 +4807,7 @@
           <a:p>
             <a:fld id="{C747211F-258E-46ED-BA6A-514D91012CD2}" type="datetimeFigureOut">
               <a:rPr lang="en-US" smtClean="0"/>
-              <a:t>2/21/2019</a:t>
+              <a:t>2/25/2019</a:t>
             </a:fld>
             <a:endParaRPr lang="en-US"/>
           </a:p>
@@ -4894,7 +5020,7 @@
           <a:p>
             <a:fld id="{C747211F-258E-46ED-BA6A-514D91012CD2}" type="datetimeFigureOut">
               <a:rPr lang="en-US" smtClean="0"/>
-              <a:t>2/21/2019</a:t>
+              <a:t>2/25/2019</a:t>
             </a:fld>
             <a:endParaRPr lang="en-US"/>
           </a:p>
@@ -5276,7 +5402,7 @@
           <p:nvPr>
             <p:extLst>
               <p:ext uri="{D42A27DB-BD31-4B8C-83A1-F6EECF244321}">
-                <p14:modId xmlns:p14="http://schemas.microsoft.com/office/powerpoint/2010/main" val="3323188398"/>
+                <p14:modId xmlns:p14="http://schemas.microsoft.com/office/powerpoint/2010/main" val="3740072615"/>
               </p:ext>
             </p:extLst>
           </p:nvPr>

</xml_diff>

<commit_message>
oox smartart, picture strip: fix lack of spacing around the picture list
The snake algorithm in PowerPoint seem to interpret spacing as follows:
if you have N elements, then there should be the requested amount of
spacing between the elements, and also double amount of spacing around
the actual list of elements.

With this, the SmartArt and the title shape in the bugdoc no longer
overlaps.

Change-Id: I5d6885b434bfaff9de9aac595a298a5346524e19
Reviewed-on: https://gerrit.libreoffice.org/68397
Reviewed-by: Miklos Vajna <vmiklos@collabora.com>
Tested-by: Jenkins
</commit_message>
<xml_diff>
--- a/sd/qa/unit/data/pptx/smartart-picture-strip.pptx
+++ b/sd/qa/unit/data/pptx/smartart-picture-strip.pptx
@@ -2588,7 +2588,7 @@
           <a:p>
             <a:fld id="{C747211F-258E-46ED-BA6A-514D91012CD2}" type="datetimeFigureOut">
               <a:rPr lang="en-US" smtClean="0"/>
-              <a:t>2/25/2019</a:t>
+              <a:t>2/26/2019</a:t>
             </a:fld>
             <a:endParaRPr lang="en-US"/>
           </a:p>
@@ -2758,7 +2758,7 @@
           <a:p>
             <a:fld id="{C747211F-258E-46ED-BA6A-514D91012CD2}" type="datetimeFigureOut">
               <a:rPr lang="en-US" smtClean="0"/>
-              <a:t>2/25/2019</a:t>
+              <a:t>2/26/2019</a:t>
             </a:fld>
             <a:endParaRPr lang="en-US"/>
           </a:p>
@@ -2938,7 +2938,7 @@
           <a:p>
             <a:fld id="{C747211F-258E-46ED-BA6A-514D91012CD2}" type="datetimeFigureOut">
               <a:rPr lang="en-US" smtClean="0"/>
-              <a:t>2/25/2019</a:t>
+              <a:t>2/26/2019</a:t>
             </a:fld>
             <a:endParaRPr lang="en-US"/>
           </a:p>
@@ -3108,7 +3108,7 @@
           <a:p>
             <a:fld id="{C747211F-258E-46ED-BA6A-514D91012CD2}" type="datetimeFigureOut">
               <a:rPr lang="en-US" smtClean="0"/>
-              <a:t>2/25/2019</a:t>
+              <a:t>2/26/2019</a:t>
             </a:fld>
             <a:endParaRPr lang="en-US"/>
           </a:p>
@@ -3354,7 +3354,7 @@
           <a:p>
             <a:fld id="{C747211F-258E-46ED-BA6A-514D91012CD2}" type="datetimeFigureOut">
               <a:rPr lang="en-US" smtClean="0"/>
-              <a:t>2/25/2019</a:t>
+              <a:t>2/26/2019</a:t>
             </a:fld>
             <a:endParaRPr lang="en-US"/>
           </a:p>
@@ -3642,7 +3642,7 @@
           <a:p>
             <a:fld id="{C747211F-258E-46ED-BA6A-514D91012CD2}" type="datetimeFigureOut">
               <a:rPr lang="en-US" smtClean="0"/>
-              <a:t>2/25/2019</a:t>
+              <a:t>2/26/2019</a:t>
             </a:fld>
             <a:endParaRPr lang="en-US"/>
           </a:p>
@@ -4064,7 +4064,7 @@
           <a:p>
             <a:fld id="{C747211F-258E-46ED-BA6A-514D91012CD2}" type="datetimeFigureOut">
               <a:rPr lang="en-US" smtClean="0"/>
-              <a:t>2/25/2019</a:t>
+              <a:t>2/26/2019</a:t>
             </a:fld>
             <a:endParaRPr lang="en-US"/>
           </a:p>
@@ -4182,7 +4182,7 @@
           <a:p>
             <a:fld id="{C747211F-258E-46ED-BA6A-514D91012CD2}" type="datetimeFigureOut">
               <a:rPr lang="en-US" smtClean="0"/>
-              <a:t>2/25/2019</a:t>
+              <a:t>2/26/2019</a:t>
             </a:fld>
             <a:endParaRPr lang="en-US"/>
           </a:p>
@@ -4277,7 +4277,7 @@
           <a:p>
             <a:fld id="{C747211F-258E-46ED-BA6A-514D91012CD2}" type="datetimeFigureOut">
               <a:rPr lang="en-US" smtClean="0"/>
-              <a:t>2/25/2019</a:t>
+              <a:t>2/26/2019</a:t>
             </a:fld>
             <a:endParaRPr lang="en-US"/>
           </a:p>
@@ -4554,7 +4554,7 @@
           <a:p>
             <a:fld id="{C747211F-258E-46ED-BA6A-514D91012CD2}" type="datetimeFigureOut">
               <a:rPr lang="en-US" smtClean="0"/>
-              <a:t>2/25/2019</a:t>
+              <a:t>2/26/2019</a:t>
             </a:fld>
             <a:endParaRPr lang="en-US"/>
           </a:p>
@@ -4807,7 +4807,7 @@
           <a:p>
             <a:fld id="{C747211F-258E-46ED-BA6A-514D91012CD2}" type="datetimeFigureOut">
               <a:rPr lang="en-US" smtClean="0"/>
-              <a:t>2/25/2019</a:t>
+              <a:t>2/26/2019</a:t>
             </a:fld>
             <a:endParaRPr lang="en-US"/>
           </a:p>
@@ -5020,7 +5020,7 @@
           <a:p>
             <a:fld id="{C747211F-258E-46ED-BA6A-514D91012CD2}" type="datetimeFigureOut">
               <a:rPr lang="en-US" smtClean="0"/>
-              <a:t>2/25/2019</a:t>
+              <a:t>2/26/2019</a:t>
             </a:fld>
             <a:endParaRPr lang="en-US"/>
           </a:p>
@@ -5402,14 +5402,14 @@
           <p:nvPr>
             <p:extLst>
               <p:ext uri="{D42A27DB-BD31-4B8C-83A1-F6EECF244321}">
-                <p14:modId xmlns:p14="http://schemas.microsoft.com/office/powerpoint/2010/main" val="3740072615"/>
+                <p14:modId xmlns:p14="http://schemas.microsoft.com/office/powerpoint/2010/main" val="1767513266"/>
               </p:ext>
             </p:extLst>
           </p:nvPr>
         </p:nvGraphicFramePr>
         <p:xfrm>
-          <a:off x="1524000" y="1397000"/>
-          <a:ext cx="6096000" cy="4064000"/>
+          <a:off x="2419200" y="835200"/>
+          <a:ext cx="6096000" cy="5418000"/>
         </p:xfrm>
         <a:graphic>
           <a:graphicData uri="http://schemas.openxmlformats.org/drawingml/2006/diagram">
@@ -5417,6 +5417,46 @@
           </a:graphicData>
         </a:graphic>
       </p:graphicFrame>
+      <p:sp>
+        <p:nvSpPr>
+          <p:cNvPr id="2" name="TextBox 1"/>
+          <p:cNvSpPr txBox="1"/>
+          <p:nvPr/>
+        </p:nvSpPr>
+        <p:spPr>
+          <a:xfrm>
+            <a:off x="457200" y="273600"/>
+            <a:ext cx="8229600" cy="1144800"/>
+          </a:xfrm>
+          <a:prstGeom prst="rect">
+            <a:avLst/>
+          </a:prstGeom>
+          <a:noFill/>
+        </p:spPr>
+        <p:txBody>
+          <a:bodyPr wrap="none" rtlCol="0">
+            <a:spAutoFit/>
+          </a:bodyPr>
+          <a:lstStyle/>
+          <a:p>
+            <a:r>
+              <a:rPr lang="en-US" sz="4400" dirty="0" smtClean="0">
+                <a:latin typeface="+mj-lt"/>
+              </a:rPr>
+              <a:t>Foo Bar </a:t>
+            </a:r>
+            <a:r>
+              <a:rPr lang="en-US" sz="4400" dirty="0" err="1" smtClean="0">
+                <a:latin typeface="+mj-lt"/>
+              </a:rPr>
+              <a:t>Baz Blah</a:t>
+            </a:r>
+            <a:endParaRPr lang="en-US" sz="4400" dirty="0">
+              <a:latin typeface="+mj-lt"/>
+            </a:endParaRPr>
+          </a:p>
+        </p:txBody>
+      </p:sp>
     </p:spTree>
     <p:extLst>
       <p:ext uri="{BB962C8B-B14F-4D97-AF65-F5344CB8AC3E}">

</xml_diff>